<commit_message>
dados das associações e voluntários nos canis
</commit_message>
<xml_diff>
--- a/briefing.pptx
+++ b/briefing.pptx
@@ -5,17 +5,18 @@
     <p:sldMasterId id="2147483648" r:id="rId1"/>
   </p:sldMasterIdLst>
   <p:notesMasterIdLst>
-    <p:notesMasterId r:id="rId10"/>
+    <p:notesMasterId r:id="rId11"/>
   </p:notesMasterIdLst>
   <p:sldIdLst>
     <p:sldId id="256" r:id="rId2"/>
     <p:sldId id="257" r:id="rId3"/>
     <p:sldId id="258" r:id="rId4"/>
     <p:sldId id="259" r:id="rId5"/>
-    <p:sldId id="260" r:id="rId6"/>
-    <p:sldId id="261" r:id="rId7"/>
-    <p:sldId id="262" r:id="rId8"/>
-    <p:sldId id="263" r:id="rId9"/>
+    <p:sldId id="264" r:id="rId6"/>
+    <p:sldId id="260" r:id="rId7"/>
+    <p:sldId id="261" r:id="rId8"/>
+    <p:sldId id="262" r:id="rId9"/>
+    <p:sldId id="263" r:id="rId10"/>
   </p:sldIdLst>
   <p:sldSz cx="12192000" cy="6858000"/>
   <p:notesSz cx="6858000" cy="9144000"/>
@@ -114,6 +115,11 @@
       </a:defRPr>
     </a:lvl9pPr>
   </p:defaultTextStyle>
+  <p:extLst>
+    <p:ext uri="{EFAFB233-063F-42B5-8137-9DF3F51BA10A}">
+      <p15:sldGuideLst xmlns:p15="http://schemas.microsoft.com/office/powerpoint/2012/main"/>
+    </p:ext>
+  </p:extLst>
 </p:presentation>
 </file>
 
@@ -199,7 +205,7 @@
           <a:p>
             <a:fld id="{7C40AE21-8196-BD40-BB00-CDE18DFF6A3D}" type="datetimeFigureOut">
               <a:rPr lang="en-US" smtClean="0"/>
-              <a:t>4/11/18</a:t>
+              <a:t>4/12/18</a:t>
             </a:fld>
             <a:endParaRPr lang="en-US"/>
           </a:p>
@@ -840,11 +846,11 @@
             </a:r>
             <a:r>
               <a:rPr lang="en-US" baseline="0" dirty="0" smtClean="0"/>
-              <a:t> dos </a:t>
+              <a:t> das </a:t>
             </a:r>
             <a:r>
               <a:rPr lang="en-US" baseline="0" dirty="0" err="1" smtClean="0"/>
-              <a:t>canis</a:t>
+              <a:t>associaçoes</a:t>
             </a:r>
             <a:endParaRPr lang="en-US" dirty="0" smtClean="0"/>
           </a:p>
@@ -968,17 +974,12 @@
             </a:r>
             <a:r>
               <a:rPr lang="en-US" baseline="0" dirty="0" err="1" smtClean="0"/>
-              <a:t>individuos</a:t>
-            </a:r>
-            <a:r>
-              <a:rPr lang="en-US" baseline="0" dirty="0" smtClean="0"/>
-              <a:t> </a:t>
-            </a:r>
-            <a:r>
-              <a:rPr lang="en-US" baseline="0" dirty="0" err="1" smtClean="0"/>
-              <a:t>comuns</a:t>
+              <a:t>canis</a:t>
             </a:r>
             <a:endParaRPr lang="en-US" dirty="0" smtClean="0"/>
+          </a:p>
+          <a:p>
+            <a:endParaRPr lang="en-US" dirty="0"/>
           </a:p>
         </p:txBody>
       </p:sp>
@@ -1008,7 +1009,7 @@
     </p:spTree>
     <p:extLst>
       <p:ext uri="{BB962C8B-B14F-4D97-AF65-F5344CB8AC3E}">
-        <p14:creationId xmlns:p14="http://schemas.microsoft.com/office/powerpoint/2010/main" val="181244154"/>
+        <p14:creationId xmlns:p14="http://schemas.microsoft.com/office/powerpoint/2010/main" val="1598311185"/>
       </p:ext>
     </p:extLst>
   </p:cSld>
@@ -1062,27 +1063,52 @@
           <a:bodyPr/>
           <a:lstStyle/>
           <a:p>
+            <a:pPr marL="0" marR="0" indent="0" algn="l" defTabSz="914400" rtl="0" eaLnBrk="1" fontAlgn="auto" latinLnBrk="0" hangingPunct="1">
+              <a:lnSpc>
+                <a:spcPct val="100000"/>
+              </a:lnSpc>
+              <a:spcBef>
+                <a:spcPts val="0"/>
+              </a:spcBef>
+              <a:spcAft>
+                <a:spcPts val="0"/>
+              </a:spcAft>
+              <a:buClrTx/>
+              <a:buSzTx/>
+              <a:buFontTx/>
+              <a:buNone/>
+              <a:tabLst/>
+              <a:defRPr/>
+            </a:pPr>
             <a:r>
               <a:rPr lang="en-US" dirty="0" err="1" smtClean="0"/>
-              <a:t>Conclusoes</a:t>
-            </a:r>
-            <a:r>
-              <a:rPr lang="en-US" dirty="0" smtClean="0"/>
-              <a:t> a </a:t>
-            </a:r>
-            <a:r>
-              <a:rPr lang="en-US" dirty="0" err="1" smtClean="0"/>
-              <a:t>retirar</a:t>
-            </a:r>
-            <a:r>
-              <a:rPr lang="en-US" dirty="0" smtClean="0"/>
+              <a:t>Resultados</a:t>
+            </a:r>
+            <a:r>
+              <a:rPr lang="en-US" baseline="0" dirty="0" smtClean="0"/>
               <a:t> dos </a:t>
             </a:r>
             <a:r>
-              <a:rPr lang="en-US" dirty="0" err="1" smtClean="0"/>
+              <a:rPr lang="en-US" baseline="0" dirty="0" err="1" smtClean="0"/>
               <a:t>inqueritos</a:t>
             </a:r>
-            <a:endParaRPr lang="en-US" dirty="0"/>
+            <a:r>
+              <a:rPr lang="en-US" baseline="0" dirty="0" smtClean="0"/>
+              <a:t> dos </a:t>
+            </a:r>
+            <a:r>
+              <a:rPr lang="en-US" baseline="0" dirty="0" err="1" smtClean="0"/>
+              <a:t>individuos</a:t>
+            </a:r>
+            <a:r>
+              <a:rPr lang="en-US" baseline="0" dirty="0" smtClean="0"/>
+              <a:t> </a:t>
+            </a:r>
+            <a:r>
+              <a:rPr lang="en-US" baseline="0" dirty="0" err="1" smtClean="0"/>
+              <a:t>comuns</a:t>
+            </a:r>
+            <a:endParaRPr lang="en-US" dirty="0" smtClean="0"/>
           </a:p>
         </p:txBody>
       </p:sp>
@@ -1112,7 +1138,7 @@
     </p:spTree>
     <p:extLst>
       <p:ext uri="{BB962C8B-B14F-4D97-AF65-F5344CB8AC3E}">
-        <p14:creationId xmlns:p14="http://schemas.microsoft.com/office/powerpoint/2010/main" val="457493346"/>
+        <p14:creationId xmlns:p14="http://schemas.microsoft.com/office/powerpoint/2010/main" val="181244154"/>
       </p:ext>
     </p:extLst>
   </p:cSld>
@@ -1167,18 +1193,24 @@
           <a:lstStyle/>
           <a:p>
             <a:r>
+              <a:rPr lang="en-US" dirty="0" err="1" smtClean="0"/>
+              <a:t>Conclusoes</a:t>
+            </a:r>
+            <a:r>
               <a:rPr lang="en-US" dirty="0" smtClean="0"/>
-              <a:t>Mock</a:t>
-            </a:r>
-            <a:r>
-              <a:rPr lang="en-US" baseline="0" dirty="0" smtClean="0"/>
-              <a:t> ups;</a:t>
-            </a:r>
-          </a:p>
-          <a:p>
-            <a:r>
-              <a:rPr lang="en-US" baseline="0" dirty="0" smtClean="0"/>
-              <a:t>features</a:t>
+              <a:t> a </a:t>
+            </a:r>
+            <a:r>
+              <a:rPr lang="en-US" dirty="0" err="1" smtClean="0"/>
+              <a:t>retirar</a:t>
+            </a:r>
+            <a:r>
+              <a:rPr lang="en-US" dirty="0" smtClean="0"/>
+              <a:t> dos </a:t>
+            </a:r>
+            <a:r>
+              <a:rPr lang="en-US" dirty="0" err="1" smtClean="0"/>
+              <a:t>inqueritos</a:t>
             </a:r>
             <a:endParaRPr lang="en-US" dirty="0"/>
           </a:p>
@@ -1210,7 +1242,7 @@
     </p:spTree>
     <p:extLst>
       <p:ext uri="{BB962C8B-B14F-4D97-AF65-F5344CB8AC3E}">
-        <p14:creationId xmlns:p14="http://schemas.microsoft.com/office/powerpoint/2010/main" val="784789620"/>
+        <p14:creationId xmlns:p14="http://schemas.microsoft.com/office/powerpoint/2010/main" val="457493346"/>
       </p:ext>
     </p:extLst>
   </p:cSld>
@@ -1265,6 +1297,104 @@
           <a:lstStyle/>
           <a:p>
             <a:r>
+              <a:rPr lang="en-US" dirty="0" smtClean="0"/>
+              <a:t>Mock</a:t>
+            </a:r>
+            <a:r>
+              <a:rPr lang="en-US" baseline="0" dirty="0" smtClean="0"/>
+              <a:t> ups;</a:t>
+            </a:r>
+          </a:p>
+          <a:p>
+            <a:r>
+              <a:rPr lang="en-US" baseline="0" dirty="0" smtClean="0"/>
+              <a:t>features</a:t>
+            </a:r>
+            <a:endParaRPr lang="en-US" dirty="0"/>
+          </a:p>
+        </p:txBody>
+      </p:sp>
+      <p:sp>
+        <p:nvSpPr>
+          <p:cNvPr id="4" name="Slide Number Placeholder 3"/>
+          <p:cNvSpPr>
+            <a:spLocks noGrp="1"/>
+          </p:cNvSpPr>
+          <p:nvPr>
+            <p:ph type="sldNum" sz="quarter" idx="10"/>
+          </p:nvPr>
+        </p:nvSpPr>
+        <p:spPr/>
+        <p:txBody>
+          <a:bodyPr/>
+          <a:lstStyle/>
+          <a:p>
+            <a:fld id="{811659F9-659C-704A-BD93-2EC26014AB33}" type="slidenum">
+              <a:rPr lang="en-US" smtClean="0"/>
+              <a:t>8</a:t>
+            </a:fld>
+            <a:endParaRPr lang="en-US"/>
+          </a:p>
+        </p:txBody>
+      </p:sp>
+    </p:spTree>
+    <p:extLst>
+      <p:ext uri="{BB962C8B-B14F-4D97-AF65-F5344CB8AC3E}">
+        <p14:creationId xmlns:p14="http://schemas.microsoft.com/office/powerpoint/2010/main" val="784789620"/>
+      </p:ext>
+    </p:extLst>
+  </p:cSld>
+  <p:clrMapOvr>
+    <a:masterClrMapping/>
+  </p:clrMapOvr>
+</p:notes>
+</file>
+
+<file path=ppt/notesSlides/notesSlide9.xml><?xml version="1.0" encoding="utf-8"?>
+<p:notes xmlns:a="http://schemas.openxmlformats.org/drawingml/2006/main" xmlns:r="http://schemas.openxmlformats.org/officeDocument/2006/relationships" xmlns:p="http://schemas.openxmlformats.org/presentationml/2006/main">
+  <p:cSld>
+    <p:spTree>
+      <p:nvGrpSpPr>
+        <p:cNvPr id="1" name=""/>
+        <p:cNvGrpSpPr/>
+        <p:nvPr/>
+      </p:nvGrpSpPr>
+      <p:grpSpPr>
+        <a:xfrm>
+          <a:off x="0" y="0"/>
+          <a:ext cx="0" cy="0"/>
+          <a:chOff x="0" y="0"/>
+          <a:chExt cx="0" cy="0"/>
+        </a:xfrm>
+      </p:grpSpPr>
+      <p:sp>
+        <p:nvSpPr>
+          <p:cNvPr id="2" name="Slide Image Placeholder 1"/>
+          <p:cNvSpPr>
+            <a:spLocks noGrp="1" noRot="1" noChangeAspect="1"/>
+          </p:cNvSpPr>
+          <p:nvPr>
+            <p:ph type="sldImg"/>
+          </p:nvPr>
+        </p:nvSpPr>
+        <p:spPr/>
+      </p:sp>
+      <p:sp>
+        <p:nvSpPr>
+          <p:cNvPr id="3" name="Notes Placeholder 2"/>
+          <p:cNvSpPr>
+            <a:spLocks noGrp="1"/>
+          </p:cNvSpPr>
+          <p:nvPr>
+            <p:ph type="body" idx="1"/>
+          </p:nvPr>
+        </p:nvSpPr>
+        <p:spPr/>
+        <p:txBody>
+          <a:bodyPr/>
+          <a:lstStyle/>
+          <a:p>
+            <a:r>
               <a:rPr lang="en-US" dirty="0" err="1" smtClean="0"/>
               <a:t>Perguntas</a:t>
             </a:r>
@@ -1297,7 +1427,7 @@
           <a:p>
             <a:fld id="{811659F9-659C-704A-BD93-2EC26014AB33}" type="slidenum">
               <a:rPr lang="en-US" smtClean="0"/>
-              <a:t>8</a:t>
+              <a:t>9</a:t>
             </a:fld>
             <a:endParaRPr lang="en-US"/>
           </a:p>
@@ -1447,7 +1577,7 @@
           <a:p>
             <a:fld id="{4E1CDBF5-4153-5B4D-B246-08DB0FB05747}" type="datetimeFigureOut">
               <a:rPr lang="en-US" smtClean="0"/>
-              <a:t>4/11/18</a:t>
+              <a:t>4/12/18</a:t>
             </a:fld>
             <a:endParaRPr lang="en-US"/>
           </a:p>
@@ -1617,7 +1747,7 @@
           <a:p>
             <a:fld id="{4E1CDBF5-4153-5B4D-B246-08DB0FB05747}" type="datetimeFigureOut">
               <a:rPr lang="en-US" smtClean="0"/>
-              <a:t>4/11/18</a:t>
+              <a:t>4/12/18</a:t>
             </a:fld>
             <a:endParaRPr lang="en-US"/>
           </a:p>
@@ -1797,7 +1927,7 @@
           <a:p>
             <a:fld id="{4E1CDBF5-4153-5B4D-B246-08DB0FB05747}" type="datetimeFigureOut">
               <a:rPr lang="en-US" smtClean="0"/>
-              <a:t>4/11/18</a:t>
+              <a:t>4/12/18</a:t>
             </a:fld>
             <a:endParaRPr lang="en-US"/>
           </a:p>
@@ -1967,7 +2097,7 @@
           <a:p>
             <a:fld id="{4E1CDBF5-4153-5B4D-B246-08DB0FB05747}" type="datetimeFigureOut">
               <a:rPr lang="en-US" smtClean="0"/>
-              <a:t>4/11/18</a:t>
+              <a:t>4/12/18</a:t>
             </a:fld>
             <a:endParaRPr lang="en-US"/>
           </a:p>
@@ -2213,7 +2343,7 @@
           <a:p>
             <a:fld id="{4E1CDBF5-4153-5B4D-B246-08DB0FB05747}" type="datetimeFigureOut">
               <a:rPr lang="en-US" smtClean="0"/>
-              <a:t>4/11/18</a:t>
+              <a:t>4/12/18</a:t>
             </a:fld>
             <a:endParaRPr lang="en-US"/>
           </a:p>
@@ -2445,7 +2575,7 @@
           <a:p>
             <a:fld id="{4E1CDBF5-4153-5B4D-B246-08DB0FB05747}" type="datetimeFigureOut">
               <a:rPr lang="en-US" smtClean="0"/>
-              <a:t>4/11/18</a:t>
+              <a:t>4/12/18</a:t>
             </a:fld>
             <a:endParaRPr lang="en-US"/>
           </a:p>
@@ -2812,7 +2942,7 @@
           <a:p>
             <a:fld id="{4E1CDBF5-4153-5B4D-B246-08DB0FB05747}" type="datetimeFigureOut">
               <a:rPr lang="en-US" smtClean="0"/>
-              <a:t>4/11/18</a:t>
+              <a:t>4/12/18</a:t>
             </a:fld>
             <a:endParaRPr lang="en-US"/>
           </a:p>
@@ -2930,7 +3060,7 @@
           <a:p>
             <a:fld id="{4E1CDBF5-4153-5B4D-B246-08DB0FB05747}" type="datetimeFigureOut">
               <a:rPr lang="en-US" smtClean="0"/>
-              <a:t>4/11/18</a:t>
+              <a:t>4/12/18</a:t>
             </a:fld>
             <a:endParaRPr lang="en-US"/>
           </a:p>
@@ -3025,7 +3155,7 @@
           <a:p>
             <a:fld id="{4E1CDBF5-4153-5B4D-B246-08DB0FB05747}" type="datetimeFigureOut">
               <a:rPr lang="en-US" smtClean="0"/>
-              <a:t>4/11/18</a:t>
+              <a:t>4/12/18</a:t>
             </a:fld>
             <a:endParaRPr lang="en-US"/>
           </a:p>
@@ -3302,7 +3432,7 @@
           <a:p>
             <a:fld id="{4E1CDBF5-4153-5B4D-B246-08DB0FB05747}" type="datetimeFigureOut">
               <a:rPr lang="en-US" smtClean="0"/>
-              <a:t>4/11/18</a:t>
+              <a:t>4/12/18</a:t>
             </a:fld>
             <a:endParaRPr lang="en-US"/>
           </a:p>
@@ -3555,7 +3685,7 @@
           <a:p>
             <a:fld id="{4E1CDBF5-4153-5B4D-B246-08DB0FB05747}" type="datetimeFigureOut">
               <a:rPr lang="en-US" smtClean="0"/>
-              <a:t>4/11/18</a:t>
+              <a:t>4/12/18</a:t>
             </a:fld>
             <a:endParaRPr lang="en-US"/>
           </a:p>
@@ -3768,7 +3898,7 @@
           <a:p>
             <a:fld id="{4E1CDBF5-4153-5B4D-B246-08DB0FB05747}" type="datetimeFigureOut">
               <a:rPr lang="en-US" smtClean="0"/>
-              <a:t>4/11/18</a:t>
+              <a:t>4/12/18</a:t>
             </a:fld>
             <a:endParaRPr lang="en-US"/>
           </a:p>
@@ -4279,44 +4409,6 @@
           <a:chExt cx="0" cy="0"/>
         </a:xfrm>
       </p:grpSpPr>
-      <p:sp>
-        <p:nvSpPr>
-          <p:cNvPr id="2" name="Title 1"/>
-          <p:cNvSpPr>
-            <a:spLocks noGrp="1"/>
-          </p:cNvSpPr>
-          <p:nvPr>
-            <p:ph type="title"/>
-          </p:nvPr>
-        </p:nvSpPr>
-        <p:spPr/>
-        <p:txBody>
-          <a:bodyPr/>
-          <a:lstStyle/>
-          <a:p>
-            <a:endParaRPr lang="en-US"/>
-          </a:p>
-        </p:txBody>
-      </p:sp>
-      <p:sp>
-        <p:nvSpPr>
-          <p:cNvPr id="3" name="Content Placeholder 2"/>
-          <p:cNvSpPr>
-            <a:spLocks noGrp="1"/>
-          </p:cNvSpPr>
-          <p:nvPr>
-            <p:ph idx="1"/>
-          </p:nvPr>
-        </p:nvSpPr>
-        <p:spPr/>
-        <p:txBody>
-          <a:bodyPr/>
-          <a:lstStyle/>
-          <a:p>
-            <a:endParaRPr lang="en-US" dirty="0"/>
-          </a:p>
-        </p:txBody>
-      </p:sp>
     </p:spTree>
     <p:extLst>
       <p:ext uri="{BB962C8B-B14F-4D97-AF65-F5344CB8AC3E}">
@@ -4456,7 +4548,7 @@
     </p:spTree>
     <p:extLst>
       <p:ext uri="{BB962C8B-B14F-4D97-AF65-F5344CB8AC3E}">
-        <p14:creationId xmlns:p14="http://schemas.microsoft.com/office/powerpoint/2010/main" val="1551927959"/>
+        <p14:creationId xmlns:p14="http://schemas.microsoft.com/office/powerpoint/2010/main" val="845953475"/>
       </p:ext>
     </p:extLst>
   </p:cSld>
@@ -4524,7 +4616,7 @@
     </p:spTree>
     <p:extLst>
       <p:ext uri="{BB962C8B-B14F-4D97-AF65-F5344CB8AC3E}">
-        <p14:creationId xmlns:p14="http://schemas.microsoft.com/office/powerpoint/2010/main" val="773837455"/>
+        <p14:creationId xmlns:p14="http://schemas.microsoft.com/office/powerpoint/2010/main" val="1551927959"/>
       </p:ext>
     </p:extLst>
   </p:cSld>
@@ -4592,6 +4684,74 @@
     </p:spTree>
     <p:extLst>
       <p:ext uri="{BB962C8B-B14F-4D97-AF65-F5344CB8AC3E}">
+        <p14:creationId xmlns:p14="http://schemas.microsoft.com/office/powerpoint/2010/main" val="773837455"/>
+      </p:ext>
+    </p:extLst>
+  </p:cSld>
+  <p:clrMapOvr>
+    <a:masterClrMapping/>
+  </p:clrMapOvr>
+</p:sld>
+</file>
+
+<file path=ppt/slides/slide8.xml><?xml version="1.0" encoding="utf-8"?>
+<p:sld xmlns:a="http://schemas.openxmlformats.org/drawingml/2006/main" xmlns:r="http://schemas.openxmlformats.org/officeDocument/2006/relationships" xmlns:p="http://schemas.openxmlformats.org/presentationml/2006/main">
+  <p:cSld>
+    <p:spTree>
+      <p:nvGrpSpPr>
+        <p:cNvPr id="1" name=""/>
+        <p:cNvGrpSpPr/>
+        <p:nvPr/>
+      </p:nvGrpSpPr>
+      <p:grpSpPr>
+        <a:xfrm>
+          <a:off x="0" y="0"/>
+          <a:ext cx="0" cy="0"/>
+          <a:chOff x="0" y="0"/>
+          <a:chExt cx="0" cy="0"/>
+        </a:xfrm>
+      </p:grpSpPr>
+      <p:sp>
+        <p:nvSpPr>
+          <p:cNvPr id="2" name="Title 1"/>
+          <p:cNvSpPr>
+            <a:spLocks noGrp="1"/>
+          </p:cNvSpPr>
+          <p:nvPr>
+            <p:ph type="title"/>
+          </p:nvPr>
+        </p:nvSpPr>
+        <p:spPr/>
+        <p:txBody>
+          <a:bodyPr/>
+          <a:lstStyle/>
+          <a:p>
+            <a:endParaRPr lang="en-US"/>
+          </a:p>
+        </p:txBody>
+      </p:sp>
+      <p:sp>
+        <p:nvSpPr>
+          <p:cNvPr id="3" name="Content Placeholder 2"/>
+          <p:cNvSpPr>
+            <a:spLocks noGrp="1"/>
+          </p:cNvSpPr>
+          <p:nvPr>
+            <p:ph idx="1"/>
+          </p:nvPr>
+        </p:nvSpPr>
+        <p:spPr/>
+        <p:txBody>
+          <a:bodyPr/>
+          <a:lstStyle/>
+          <a:p>
+            <a:endParaRPr lang="en-US"/>
+          </a:p>
+        </p:txBody>
+      </p:sp>
+    </p:spTree>
+    <p:extLst>
+      <p:ext uri="{BB962C8B-B14F-4D97-AF65-F5344CB8AC3E}">
         <p14:creationId xmlns:p14="http://schemas.microsoft.com/office/powerpoint/2010/main" val="1114679511"/>
       </p:ext>
     </p:extLst>
@@ -4602,7 +4762,7 @@
 </p:sld>
 </file>
 
-<file path=ppt/slides/slide8.xml><?xml version="1.0" encoding="utf-8"?>
+<file path=ppt/slides/slide9.xml><?xml version="1.0" encoding="utf-8"?>
 <p:sld xmlns:a="http://schemas.openxmlformats.org/drawingml/2006/main" xmlns:r="http://schemas.openxmlformats.org/officeDocument/2006/relationships" xmlns:p="http://schemas.openxmlformats.org/presentationml/2006/main">
   <p:cSld>
     <p:spTree>

</xml_diff>